<commit_message>
Adding Day 16 Code Examples for students to follow-along. Additionally adding Day 15 examples that were committed, but not pushed
</commit_message>
<xml_diff>
--- a/powerpoints/Day_15.pptx
+++ b/powerpoints/Day_15.pptx
@@ -562,7 +562,7 @@
           <a:p>
             <a:fld id="{247597C3-B3EB-4E5D-9F17-29538D6D2587}" type="datetimeFigureOut">
               <a:rPr lang="en-US" smtClean="0"/>
-              <a:t>9/27/2021</a:t>
+              <a:t>10/1/2021</a:t>
             </a:fld>
             <a:endParaRPr lang="en-US"/>
           </a:p>
@@ -37731,7 +37731,7 @@
               <a:buNone/>
             </a:pPr>
             <a:r>
-              <a:rPr lang="en-US" sz="1480">
+              <a:rPr lang="en-US" sz="1480" dirty="0">
                 <a:latin typeface="Courier New"/>
                 <a:ea typeface="Courier New"/>
                 <a:cs typeface="Courier New"/>
@@ -37740,7 +37740,7 @@
               <a:t>Exception in thread "main" </a:t>
             </a:r>
             <a:r>
-              <a:rPr lang="en-US" sz="1480">
+              <a:rPr lang="en-US" sz="1480" dirty="0" err="1">
                 <a:highlight>
                   <a:srgbClr val="FFFF00"/>
                 </a:highlight>
@@ -37752,7 +37752,7 @@
               <a:t>java.lang.ArithmeticException</a:t>
             </a:r>
             <a:r>
-              <a:rPr lang="en-US" sz="1480">
+              <a:rPr lang="en-US" sz="1480" dirty="0">
                 <a:latin typeface="Courier New"/>
                 <a:ea typeface="Courier New"/>
                 <a:cs typeface="Courier New"/>
@@ -37761,7 +37761,7 @@
               <a:t>: </a:t>
             </a:r>
             <a:r>
-              <a:rPr lang="en-US" sz="1480">
+              <a:rPr lang="en-US" sz="1480" dirty="0">
                 <a:highlight>
                   <a:srgbClr val="00FF00"/>
                 </a:highlight>
@@ -37772,7 +37772,7 @@
               </a:rPr>
               <a:t>/ by zero</a:t>
             </a:r>
-            <a:endParaRPr/>
+            <a:endParaRPr dirty="0"/>
           </a:p>
           <a:p>
             <a:pPr marL="0" lvl="0" indent="0" algn="l" rtl="0">
@@ -37789,7 +37789,7 @@
               <a:buNone/>
             </a:pPr>
             <a:r>
-              <a:rPr lang="en-US" sz="1480">
+              <a:rPr lang="en-US" sz="1480" dirty="0">
                 <a:latin typeface="Courier New"/>
                 <a:ea typeface="Courier New"/>
                 <a:cs typeface="Courier New"/>
@@ -37798,7 +37798,7 @@
               <a:t>	at </a:t>
             </a:r>
             <a:r>
-              <a:rPr lang="en-US" sz="1480">
+              <a:rPr lang="en-US" sz="1480" dirty="0" err="1">
                 <a:highlight>
                   <a:srgbClr val="00FFFF"/>
                 </a:highlight>
@@ -37810,7 +37810,7 @@
               <a:t>samples.Test.division</a:t>
             </a:r>
             <a:r>
-              <a:rPr lang="en-US" sz="1480">
+              <a:rPr lang="en-US" sz="1480" dirty="0">
                 <a:latin typeface="Courier New"/>
                 <a:ea typeface="Courier New"/>
                 <a:cs typeface="Courier New"/>
@@ -37819,7 +37819,7 @@
               <a:t>(</a:t>
             </a:r>
             <a:r>
-              <a:rPr lang="en-US" sz="1480">
+              <a:rPr lang="en-US" sz="1480" dirty="0">
                 <a:highlight>
                   <a:srgbClr val="FF00FF"/>
                 </a:highlight>
@@ -37831,7 +37831,7 @@
               <a:t>Test.java:11</a:t>
             </a:r>
             <a:r>
-              <a:rPr lang="en-US" sz="1480">
+              <a:rPr lang="en-US" sz="1480" dirty="0">
                 <a:latin typeface="Courier New"/>
                 <a:ea typeface="Courier New"/>
                 <a:cs typeface="Courier New"/>
@@ -37839,7 +37839,7 @@
               </a:rPr>
               <a:t>)</a:t>
             </a:r>
-            <a:endParaRPr/>
+            <a:endParaRPr dirty="0"/>
           </a:p>
           <a:p>
             <a:pPr marL="0" lvl="0" indent="0" algn="l" rtl="0">
@@ -37856,15 +37856,33 @@
               <a:buNone/>
             </a:pPr>
             <a:r>
-              <a:rPr lang="en-US" sz="1480">
+              <a:rPr lang="en-US" sz="1480" dirty="0">
                 <a:latin typeface="Courier New"/>
                 <a:ea typeface="Courier New"/>
                 <a:cs typeface="Courier New"/>
                 <a:sym typeface="Courier New"/>
               </a:rPr>
-              <a:t>	at samples.Test.mathInvoker(Test.java:8)</a:t>
+              <a:t>	at </a:t>
             </a:r>
-            <a:endParaRPr/>
+            <a:r>
+              <a:rPr lang="en-US" sz="1480" dirty="0" err="1">
+                <a:latin typeface="Courier New"/>
+                <a:ea typeface="Courier New"/>
+                <a:cs typeface="Courier New"/>
+                <a:sym typeface="Courier New"/>
+              </a:rPr>
+              <a:t>samples.Test.mathInvoker</a:t>
+            </a:r>
+            <a:r>
+              <a:rPr lang="en-US" sz="1480" dirty="0">
+                <a:latin typeface="Courier New"/>
+                <a:ea typeface="Courier New"/>
+                <a:cs typeface="Courier New"/>
+                <a:sym typeface="Courier New"/>
+              </a:rPr>
+              <a:t>(Test.java:8)</a:t>
+            </a:r>
+            <a:endParaRPr dirty="0"/>
           </a:p>
           <a:p>
             <a:pPr marL="0" lvl="0" indent="0" algn="l" rtl="0">
@@ -37881,15 +37899,33 @@
               <a:buNone/>
             </a:pPr>
             <a:r>
-              <a:rPr lang="en-US" sz="1480">
+              <a:rPr lang="en-US" sz="1480" dirty="0">
                 <a:latin typeface="Courier New"/>
                 <a:ea typeface="Courier New"/>
                 <a:cs typeface="Courier New"/>
                 <a:sym typeface="Courier New"/>
               </a:rPr>
-              <a:t>	at samples.Test.main(Test.java:5)</a:t>
+              <a:t>	at </a:t>
             </a:r>
-            <a:endParaRPr/>
+            <a:r>
+              <a:rPr lang="en-US" sz="1480" dirty="0" err="1">
+                <a:latin typeface="Courier New"/>
+                <a:ea typeface="Courier New"/>
+                <a:cs typeface="Courier New"/>
+                <a:sym typeface="Courier New"/>
+              </a:rPr>
+              <a:t>samples.Test.main</a:t>
+            </a:r>
+            <a:r>
+              <a:rPr lang="en-US" sz="1480" dirty="0">
+                <a:latin typeface="Courier New"/>
+                <a:ea typeface="Courier New"/>
+                <a:cs typeface="Courier New"/>
+                <a:sym typeface="Courier New"/>
+              </a:rPr>
+              <a:t>(Test.java:5)</a:t>
+            </a:r>
+            <a:endParaRPr dirty="0"/>
           </a:p>
           <a:p>
             <a:pPr marL="342900" lvl="0" indent="-342900" algn="l" rtl="0">
@@ -37906,7 +37942,7 @@
               <a:buChar char="•"/>
             </a:pPr>
             <a:r>
-              <a:rPr lang="en-US" sz="2590">
+              <a:rPr lang="en-US" sz="2590" dirty="0">
                 <a:highlight>
                   <a:srgbClr val="FFFF00"/>
                 </a:highlight>
@@ -37914,10 +37950,10 @@
               <a:t>    </a:t>
             </a:r>
             <a:r>
-              <a:rPr lang="en-US" sz="2590"/>
+              <a:rPr lang="en-US" sz="2590" dirty="0"/>
               <a:t> - The exception type (Arithmetic Exception)</a:t>
             </a:r>
-            <a:endParaRPr/>
+            <a:endParaRPr dirty="0"/>
           </a:p>
           <a:p>
             <a:pPr marL="342900" lvl="0" indent="-342900" algn="l" rtl="0">
@@ -37934,7 +37970,7 @@
               <a:buChar char="•"/>
             </a:pPr>
             <a:r>
-              <a:rPr lang="en-US" sz="2590">
+              <a:rPr lang="en-US" sz="2590" dirty="0">
                 <a:highlight>
                   <a:srgbClr val="00FF00"/>
                 </a:highlight>
@@ -37942,10 +37978,10 @@
               <a:t>    </a:t>
             </a:r>
             <a:r>
-              <a:rPr lang="en-US" sz="2590"/>
+              <a:rPr lang="en-US" sz="2590" dirty="0"/>
               <a:t> - A description of the exception (if possible)</a:t>
             </a:r>
-            <a:endParaRPr/>
+            <a:endParaRPr dirty="0"/>
           </a:p>
           <a:p>
             <a:pPr marL="342900" lvl="0" indent="-342900" algn="l" rtl="0">
@@ -37962,7 +37998,7 @@
               <a:buChar char="•"/>
             </a:pPr>
             <a:r>
-              <a:rPr lang="en-US" sz="2590">
+              <a:rPr lang="en-US" sz="2590" dirty="0">
                 <a:highlight>
                   <a:srgbClr val="00FFFF"/>
                 </a:highlight>
@@ -37970,18 +38006,18 @@
               <a:t>    </a:t>
             </a:r>
             <a:r>
-              <a:rPr lang="en-US" sz="2590"/>
+              <a:rPr lang="en-US" sz="2590" dirty="0"/>
               <a:t> - The method where the exception </a:t>
             </a:r>
             <a:r>
-              <a:rPr lang="en-US" sz="2590" i="1"/>
+              <a:rPr lang="en-US" sz="2590" i="1" dirty="0"/>
               <a:t>probably </a:t>
             </a:r>
             <a:r>
-              <a:rPr lang="en-US" sz="2590"/>
+              <a:rPr lang="en-US" sz="2590" dirty="0"/>
               <a:t>occurred</a:t>
             </a:r>
-            <a:endParaRPr/>
+            <a:endParaRPr dirty="0"/>
           </a:p>
           <a:p>
             <a:pPr marL="342900" lvl="0" indent="-342900" algn="l" rtl="0">
@@ -37998,7 +38034,7 @@
               <a:buChar char="•"/>
             </a:pPr>
             <a:r>
-              <a:rPr lang="en-US" sz="2590">
+              <a:rPr lang="en-US" sz="2590" dirty="0">
                 <a:highlight>
                   <a:srgbClr val="FF00FF"/>
                 </a:highlight>
@@ -38006,14 +38042,14 @@
               <a:t>    </a:t>
             </a:r>
             <a:r>
-              <a:rPr lang="en-US" sz="2590"/>
+              <a:rPr lang="en-US" sz="2590" dirty="0"/>
               <a:t> - The line of code where the exception occurred </a:t>
             </a:r>
             <a:r>
-              <a:rPr lang="en-US" sz="2590" i="1"/>
+              <a:rPr lang="en-US" sz="2590" i="1" dirty="0"/>
               <a:t>or where the next function was called</a:t>
             </a:r>
-            <a:endParaRPr/>
+            <a:endParaRPr dirty="0"/>
           </a:p>
           <a:p>
             <a:pPr marL="342900" lvl="0" indent="-342900" algn="l" rtl="0">
@@ -38030,10 +38066,18 @@
               <a:buChar char="•"/>
             </a:pPr>
             <a:r>
-              <a:rPr lang="en-US" sz="2590"/>
-              <a:t>main() invoked mathInvoker() at line 5, which invoked division() at line 8, which generated an exception at line 11.</a:t>
+              <a:rPr lang="en-US" sz="2590" dirty="0"/>
+              <a:t>main() invoked </a:t>
             </a:r>
-            <a:endParaRPr/>
+            <a:r>
+              <a:rPr lang="en-US" sz="2590" dirty="0" err="1"/>
+              <a:t>mathInvoker</a:t>
+            </a:r>
+            <a:r>
+              <a:rPr lang="en-US" sz="2590" dirty="0"/>
+              <a:t>() at line 5, which invoked division() at line 8, which generated an exception at line 11.</a:t>
+            </a:r>
+            <a:endParaRPr dirty="0"/>
           </a:p>
         </p:txBody>
       </p:sp>
@@ -38202,10 +38246,10 @@
               <a:buChar char="•"/>
             </a:pPr>
             <a:r>
-              <a:rPr lang="en-US" sz="2590"/>
+              <a:rPr lang="en-US" sz="2590" dirty="0"/>
               <a:t>The source of a problem isn’t always where the exception occurs. In the previous example, the source of the error was in the bad data provided in main(), even though the exception occurred in division()</a:t>
             </a:r>
-            <a:endParaRPr/>
+            <a:endParaRPr dirty="0"/>
           </a:p>
           <a:p>
             <a:pPr marL="342900" lvl="0" indent="-342900" algn="l" rtl="0">
@@ -38222,10 +38266,10 @@
               <a:buChar char="•"/>
             </a:pPr>
             <a:r>
-              <a:rPr lang="en-US" sz="2590"/>
+              <a:rPr lang="en-US" sz="2590" dirty="0"/>
               <a:t>Exception descriptions are not always useful, but generally are</a:t>
             </a:r>
-            <a:endParaRPr/>
+            <a:endParaRPr dirty="0"/>
           </a:p>
           <a:p>
             <a:pPr marL="342900" lvl="0" indent="-342900" algn="l" rtl="0">
@@ -38242,18 +38286,18 @@
               <a:buChar char="•"/>
             </a:pPr>
             <a:r>
-              <a:rPr lang="en-US" sz="2590"/>
+              <a:rPr lang="en-US" sz="2590" dirty="0"/>
               <a:t>When using some libraries, the actual method invocation that </a:t>
             </a:r>
             <a:r>
-              <a:rPr lang="en-US" sz="2590" i="1"/>
+              <a:rPr lang="en-US" sz="2590" i="1" dirty="0"/>
               <a:t>caused</a:t>
             </a:r>
             <a:r>
-              <a:rPr lang="en-US" sz="2590"/>
+              <a:rPr lang="en-US" sz="2590" dirty="0"/>
               <a:t> the exception could be buried in the stack, as the library continues to put its own function calls on top of the stack after the exception.</a:t>
             </a:r>
-            <a:endParaRPr/>
+            <a:endParaRPr dirty="0"/>
           </a:p>
         </p:txBody>
       </p:sp>

</xml_diff>